<commit_message>
Added tetris graphical glitch image.
</commit_message>
<xml_diff>
--- a/Tetris.pptx
+++ b/Tetris.pptx
@@ -109,7 +109,27 @@
       </a:defRPr>
     </a:lvl9pPr>
   </p:defaultTextStyle>
+  <p:extLst>
+    <p:ext uri="{EFAFB233-063F-42B5-8137-9DF3F51BA10A}">
+      <p15:sldGuideLst xmlns:p15="http://schemas.microsoft.com/office/powerpoint/2012/main">
+        <p15:guide id="1" orient="horz" pos="2160">
+          <p15:clr>
+            <a:srgbClr val="A4A3A4"/>
+          </p15:clr>
+        </p15:guide>
+        <p15:guide id="2" pos="2880">
+          <p15:clr>
+            <a:srgbClr val="A4A3A4"/>
+          </p15:clr>
+        </p15:guide>
+      </p15:sldGuideLst>
+    </p:ext>
+  </p:extLst>
 </p:presentation>
+</file>
+
+<file path=ppt/revisionInfo.xml><?xml version="1.0" encoding="utf-8"?>
+<p1510:revInfo xmlns:a="http://schemas.openxmlformats.org/drawingml/2006/main" xmlns:r="http://schemas.openxmlformats.org/officeDocument/2006/relationships" xmlns:p1510="http://schemas.microsoft.com/office/powerpoint/2015/10/main"/>
 </file>
 
 <file path=ppt/slideLayouts/slideLayout1.xml><?xml version="1.0" encoding="utf-8"?>
@@ -150,10 +170,9 @@
           <a:lstStyle/>
           <a:p>
             <a:r>
-              <a:rPr lang="nl-NL" smtClean="0"/>
+              <a:rPr lang="nl-NL"/>
               <a:t>Klik om de stijl te bewerken</a:t>
             </a:r>
-            <a:endParaRPr lang="nl-NL"/>
           </a:p>
         </p:txBody>
       </p:sp>
@@ -269,10 +288,9 @@
           </a:lstStyle>
           <a:p>
             <a:r>
-              <a:rPr lang="nl-NL" smtClean="0"/>
+              <a:rPr lang="nl-NL"/>
               <a:t>Klik om de ondertitelstijl van het model te bewerken</a:t>
             </a:r>
-            <a:endParaRPr lang="nl-NL"/>
           </a:p>
         </p:txBody>
       </p:sp>
@@ -387,10 +405,9 @@
           <a:lstStyle/>
           <a:p>
             <a:r>
-              <a:rPr lang="nl-NL" smtClean="0"/>
+              <a:rPr lang="nl-NL"/>
               <a:t>Klik om de stijl te bewerken</a:t>
             </a:r>
-            <a:endParaRPr lang="nl-NL"/>
           </a:p>
         </p:txBody>
       </p:sp>
@@ -411,38 +428,37 @@
           <a:p>
             <a:pPr lvl="0"/>
             <a:r>
-              <a:rPr lang="nl-NL" smtClean="0"/>
+              <a:rPr lang="nl-NL"/>
               <a:t>Klik om de modelstijlen te bewerken</a:t>
             </a:r>
           </a:p>
           <a:p>
             <a:pPr lvl="1"/>
             <a:r>
-              <a:rPr lang="nl-NL" smtClean="0"/>
+              <a:rPr lang="nl-NL"/>
               <a:t>Tweede niveau</a:t>
             </a:r>
           </a:p>
           <a:p>
             <a:pPr lvl="2"/>
             <a:r>
-              <a:rPr lang="nl-NL" smtClean="0"/>
+              <a:rPr lang="nl-NL"/>
               <a:t>Derde niveau</a:t>
             </a:r>
           </a:p>
           <a:p>
             <a:pPr lvl="3"/>
             <a:r>
-              <a:rPr lang="nl-NL" smtClean="0"/>
+              <a:rPr lang="nl-NL"/>
               <a:t>Vierde niveau</a:t>
             </a:r>
           </a:p>
           <a:p>
             <a:pPr lvl="4"/>
             <a:r>
-              <a:rPr lang="nl-NL" smtClean="0"/>
+              <a:rPr lang="nl-NL"/>
               <a:t>Vijfde niveau</a:t>
             </a:r>
-            <a:endParaRPr lang="nl-NL"/>
           </a:p>
         </p:txBody>
       </p:sp>
@@ -562,10 +578,9 @@
           <a:lstStyle/>
           <a:p>
             <a:r>
-              <a:rPr lang="nl-NL" smtClean="0"/>
+              <a:rPr lang="nl-NL"/>
               <a:t>Klik om de stijl te bewerken</a:t>
             </a:r>
-            <a:endParaRPr lang="nl-NL"/>
           </a:p>
         </p:txBody>
       </p:sp>
@@ -591,38 +606,37 @@
           <a:p>
             <a:pPr lvl="0"/>
             <a:r>
-              <a:rPr lang="nl-NL" smtClean="0"/>
+              <a:rPr lang="nl-NL"/>
               <a:t>Klik om de modelstijlen te bewerken</a:t>
             </a:r>
           </a:p>
           <a:p>
             <a:pPr lvl="1"/>
             <a:r>
-              <a:rPr lang="nl-NL" smtClean="0"/>
+              <a:rPr lang="nl-NL"/>
               <a:t>Tweede niveau</a:t>
             </a:r>
           </a:p>
           <a:p>
             <a:pPr lvl="2"/>
             <a:r>
-              <a:rPr lang="nl-NL" smtClean="0"/>
+              <a:rPr lang="nl-NL"/>
               <a:t>Derde niveau</a:t>
             </a:r>
           </a:p>
           <a:p>
             <a:pPr lvl="3"/>
             <a:r>
-              <a:rPr lang="nl-NL" smtClean="0"/>
+              <a:rPr lang="nl-NL"/>
               <a:t>Vierde niveau</a:t>
             </a:r>
           </a:p>
           <a:p>
             <a:pPr lvl="4"/>
             <a:r>
-              <a:rPr lang="nl-NL" smtClean="0"/>
+              <a:rPr lang="nl-NL"/>
               <a:t>Vijfde niveau</a:t>
             </a:r>
-            <a:endParaRPr lang="nl-NL"/>
           </a:p>
         </p:txBody>
       </p:sp>
@@ -737,10 +751,9 @@
           <a:lstStyle/>
           <a:p>
             <a:r>
-              <a:rPr lang="nl-NL" smtClean="0"/>
+              <a:rPr lang="nl-NL"/>
               <a:t>Klik om de stijl te bewerken</a:t>
             </a:r>
-            <a:endParaRPr lang="nl-NL"/>
           </a:p>
         </p:txBody>
       </p:sp>
@@ -761,38 +774,37 @@
           <a:p>
             <a:pPr lvl="0"/>
             <a:r>
-              <a:rPr lang="nl-NL" smtClean="0"/>
+              <a:rPr lang="nl-NL"/>
               <a:t>Klik om de modelstijlen te bewerken</a:t>
             </a:r>
           </a:p>
           <a:p>
             <a:pPr lvl="1"/>
             <a:r>
-              <a:rPr lang="nl-NL" smtClean="0"/>
+              <a:rPr lang="nl-NL"/>
               <a:t>Tweede niveau</a:t>
             </a:r>
           </a:p>
           <a:p>
             <a:pPr lvl="2"/>
             <a:r>
-              <a:rPr lang="nl-NL" smtClean="0"/>
+              <a:rPr lang="nl-NL"/>
               <a:t>Derde niveau</a:t>
             </a:r>
           </a:p>
           <a:p>
             <a:pPr lvl="3"/>
             <a:r>
-              <a:rPr lang="nl-NL" smtClean="0"/>
+              <a:rPr lang="nl-NL"/>
               <a:t>Vierde niveau</a:t>
             </a:r>
           </a:p>
           <a:p>
             <a:pPr lvl="4"/>
             <a:r>
-              <a:rPr lang="nl-NL" smtClean="0"/>
+              <a:rPr lang="nl-NL"/>
               <a:t>Vijfde niveau</a:t>
             </a:r>
-            <a:endParaRPr lang="nl-NL"/>
           </a:p>
         </p:txBody>
       </p:sp>
@@ -916,10 +928,9 @@
           </a:lstStyle>
           <a:p>
             <a:r>
-              <a:rPr lang="nl-NL" smtClean="0"/>
+              <a:rPr lang="nl-NL"/>
               <a:t>Klik om de stijl te bewerken</a:t>
             </a:r>
-            <a:endParaRPr lang="nl-NL"/>
           </a:p>
         </p:txBody>
       </p:sp>
@@ -1036,7 +1047,7 @@
           <a:p>
             <a:pPr lvl="0"/>
             <a:r>
-              <a:rPr lang="nl-NL" smtClean="0"/>
+              <a:rPr lang="nl-NL"/>
               <a:t>Klik om de modelstijlen te bewerken</a:t>
             </a:r>
           </a:p>
@@ -1153,10 +1164,9 @@
           <a:lstStyle/>
           <a:p>
             <a:r>
-              <a:rPr lang="nl-NL" smtClean="0"/>
+              <a:rPr lang="nl-NL"/>
               <a:t>Klik om de stijl te bewerken</a:t>
             </a:r>
-            <a:endParaRPr lang="nl-NL"/>
           </a:p>
         </p:txBody>
       </p:sp>
@@ -1210,38 +1220,37 @@
           <a:p>
             <a:pPr lvl="0"/>
             <a:r>
-              <a:rPr lang="nl-NL" smtClean="0"/>
+              <a:rPr lang="nl-NL"/>
               <a:t>Klik om de modelstijlen te bewerken</a:t>
             </a:r>
           </a:p>
           <a:p>
             <a:pPr lvl="1"/>
             <a:r>
-              <a:rPr lang="nl-NL" smtClean="0"/>
+              <a:rPr lang="nl-NL"/>
               <a:t>Tweede niveau</a:t>
             </a:r>
           </a:p>
           <a:p>
             <a:pPr lvl="2"/>
             <a:r>
-              <a:rPr lang="nl-NL" smtClean="0"/>
+              <a:rPr lang="nl-NL"/>
               <a:t>Derde niveau</a:t>
             </a:r>
           </a:p>
           <a:p>
             <a:pPr lvl="3"/>
             <a:r>
-              <a:rPr lang="nl-NL" smtClean="0"/>
+              <a:rPr lang="nl-NL"/>
               <a:t>Vierde niveau</a:t>
             </a:r>
           </a:p>
           <a:p>
             <a:pPr lvl="4"/>
             <a:r>
-              <a:rPr lang="nl-NL" smtClean="0"/>
+              <a:rPr lang="nl-NL"/>
               <a:t>Vijfde niveau</a:t>
             </a:r>
-            <a:endParaRPr lang="nl-NL"/>
           </a:p>
         </p:txBody>
       </p:sp>
@@ -1295,38 +1304,37 @@
           <a:p>
             <a:pPr lvl="0"/>
             <a:r>
-              <a:rPr lang="nl-NL" smtClean="0"/>
+              <a:rPr lang="nl-NL"/>
               <a:t>Klik om de modelstijlen te bewerken</a:t>
             </a:r>
           </a:p>
           <a:p>
             <a:pPr lvl="1"/>
             <a:r>
-              <a:rPr lang="nl-NL" smtClean="0"/>
+              <a:rPr lang="nl-NL"/>
               <a:t>Tweede niveau</a:t>
             </a:r>
           </a:p>
           <a:p>
             <a:pPr lvl="2"/>
             <a:r>
-              <a:rPr lang="nl-NL" smtClean="0"/>
+              <a:rPr lang="nl-NL"/>
               <a:t>Derde niveau</a:t>
             </a:r>
           </a:p>
           <a:p>
             <a:pPr lvl="3"/>
             <a:r>
-              <a:rPr lang="nl-NL" smtClean="0"/>
+              <a:rPr lang="nl-NL"/>
               <a:t>Vierde niveau</a:t>
             </a:r>
           </a:p>
           <a:p>
             <a:pPr lvl="4"/>
             <a:r>
-              <a:rPr lang="nl-NL" smtClean="0"/>
+              <a:rPr lang="nl-NL"/>
               <a:t>Vijfde niveau</a:t>
             </a:r>
-            <a:endParaRPr lang="nl-NL"/>
           </a:p>
         </p:txBody>
       </p:sp>
@@ -1445,10 +1453,9 @@
           </a:lstStyle>
           <a:p>
             <a:r>
-              <a:rPr lang="nl-NL" smtClean="0"/>
+              <a:rPr lang="nl-NL"/>
               <a:t>Klik om de stijl te bewerken</a:t>
             </a:r>
-            <a:endParaRPr lang="nl-NL"/>
           </a:p>
         </p:txBody>
       </p:sp>
@@ -1511,7 +1518,7 @@
           <a:p>
             <a:pPr lvl="0"/>
             <a:r>
-              <a:rPr lang="nl-NL" smtClean="0"/>
+              <a:rPr lang="nl-NL"/>
               <a:t>Klik om de modelstijlen te bewerken</a:t>
             </a:r>
           </a:p>
@@ -1567,38 +1574,37 @@
           <a:p>
             <a:pPr lvl="0"/>
             <a:r>
-              <a:rPr lang="nl-NL" smtClean="0"/>
+              <a:rPr lang="nl-NL"/>
               <a:t>Klik om de modelstijlen te bewerken</a:t>
             </a:r>
           </a:p>
           <a:p>
             <a:pPr lvl="1"/>
             <a:r>
-              <a:rPr lang="nl-NL" smtClean="0"/>
+              <a:rPr lang="nl-NL"/>
               <a:t>Tweede niveau</a:t>
             </a:r>
           </a:p>
           <a:p>
             <a:pPr lvl="2"/>
             <a:r>
-              <a:rPr lang="nl-NL" smtClean="0"/>
+              <a:rPr lang="nl-NL"/>
               <a:t>Derde niveau</a:t>
             </a:r>
           </a:p>
           <a:p>
             <a:pPr lvl="3"/>
             <a:r>
-              <a:rPr lang="nl-NL" smtClean="0"/>
+              <a:rPr lang="nl-NL"/>
               <a:t>Vierde niveau</a:t>
             </a:r>
           </a:p>
           <a:p>
             <a:pPr lvl="4"/>
             <a:r>
-              <a:rPr lang="nl-NL" smtClean="0"/>
+              <a:rPr lang="nl-NL"/>
               <a:t>Vijfde niveau</a:t>
             </a:r>
-            <a:endParaRPr lang="nl-NL"/>
           </a:p>
         </p:txBody>
       </p:sp>
@@ -1661,7 +1667,7 @@
           <a:p>
             <a:pPr lvl="0"/>
             <a:r>
-              <a:rPr lang="nl-NL" smtClean="0"/>
+              <a:rPr lang="nl-NL"/>
               <a:t>Klik om de modelstijlen te bewerken</a:t>
             </a:r>
           </a:p>
@@ -1717,38 +1723,37 @@
           <a:p>
             <a:pPr lvl="0"/>
             <a:r>
-              <a:rPr lang="nl-NL" smtClean="0"/>
+              <a:rPr lang="nl-NL"/>
               <a:t>Klik om de modelstijlen te bewerken</a:t>
             </a:r>
           </a:p>
           <a:p>
             <a:pPr lvl="1"/>
             <a:r>
-              <a:rPr lang="nl-NL" smtClean="0"/>
+              <a:rPr lang="nl-NL"/>
               <a:t>Tweede niveau</a:t>
             </a:r>
           </a:p>
           <a:p>
             <a:pPr lvl="2"/>
             <a:r>
-              <a:rPr lang="nl-NL" smtClean="0"/>
+              <a:rPr lang="nl-NL"/>
               <a:t>Derde niveau</a:t>
             </a:r>
           </a:p>
           <a:p>
             <a:pPr lvl="3"/>
             <a:r>
-              <a:rPr lang="nl-NL" smtClean="0"/>
+              <a:rPr lang="nl-NL"/>
               <a:t>Vierde niveau</a:t>
             </a:r>
           </a:p>
           <a:p>
             <a:pPr lvl="4"/>
             <a:r>
-              <a:rPr lang="nl-NL" smtClean="0"/>
+              <a:rPr lang="nl-NL"/>
               <a:t>Vijfde niveau</a:t>
             </a:r>
-            <a:endParaRPr lang="nl-NL"/>
           </a:p>
         </p:txBody>
       </p:sp>
@@ -1863,10 +1868,9 @@
           <a:lstStyle/>
           <a:p>
             <a:r>
-              <a:rPr lang="nl-NL" smtClean="0"/>
+              <a:rPr lang="nl-NL"/>
               <a:t>Klik om de stijl te bewerken</a:t>
             </a:r>
-            <a:endParaRPr lang="nl-NL"/>
           </a:p>
         </p:txBody>
       </p:sp>
@@ -2085,10 +2089,9 @@
           </a:lstStyle>
           <a:p>
             <a:r>
-              <a:rPr lang="nl-NL" smtClean="0"/>
+              <a:rPr lang="nl-NL"/>
               <a:t>Klik om de stijl te bewerken</a:t>
             </a:r>
-            <a:endParaRPr lang="nl-NL"/>
           </a:p>
         </p:txBody>
       </p:sp>
@@ -2142,38 +2145,37 @@
           <a:p>
             <a:pPr lvl="0"/>
             <a:r>
-              <a:rPr lang="nl-NL" smtClean="0"/>
+              <a:rPr lang="nl-NL"/>
               <a:t>Klik om de modelstijlen te bewerken</a:t>
             </a:r>
           </a:p>
           <a:p>
             <a:pPr lvl="1"/>
             <a:r>
-              <a:rPr lang="nl-NL" smtClean="0"/>
+              <a:rPr lang="nl-NL"/>
               <a:t>Tweede niveau</a:t>
             </a:r>
           </a:p>
           <a:p>
             <a:pPr lvl="2"/>
             <a:r>
-              <a:rPr lang="nl-NL" smtClean="0"/>
+              <a:rPr lang="nl-NL"/>
               <a:t>Derde niveau</a:t>
             </a:r>
           </a:p>
           <a:p>
             <a:pPr lvl="3"/>
             <a:r>
-              <a:rPr lang="nl-NL" smtClean="0"/>
+              <a:rPr lang="nl-NL"/>
               <a:t>Vierde niveau</a:t>
             </a:r>
           </a:p>
           <a:p>
             <a:pPr lvl="4"/>
             <a:r>
-              <a:rPr lang="nl-NL" smtClean="0"/>
+              <a:rPr lang="nl-NL"/>
               <a:t>Vijfde niveau</a:t>
             </a:r>
-            <a:endParaRPr lang="nl-NL"/>
           </a:p>
         </p:txBody>
       </p:sp>
@@ -2236,7 +2238,7 @@
           <a:p>
             <a:pPr lvl="0"/>
             <a:r>
-              <a:rPr lang="nl-NL" smtClean="0"/>
+              <a:rPr lang="nl-NL"/>
               <a:t>Klik om de modelstijlen te bewerken</a:t>
             </a:r>
           </a:p>
@@ -2362,10 +2364,9 @@
           </a:lstStyle>
           <a:p>
             <a:r>
-              <a:rPr lang="nl-NL" smtClean="0"/>
+              <a:rPr lang="nl-NL"/>
               <a:t>Klik om de stijl te bewerken</a:t>
             </a:r>
-            <a:endParaRPr lang="nl-NL"/>
           </a:p>
         </p:txBody>
       </p:sp>
@@ -2489,7 +2490,7 @@
           <a:p>
             <a:pPr lvl="0"/>
             <a:r>
-              <a:rPr lang="nl-NL" smtClean="0"/>
+              <a:rPr lang="nl-NL"/>
               <a:t>Klik om de modelstijlen te bewerken</a:t>
             </a:r>
           </a:p>
@@ -2621,10 +2622,9 @@
           <a:lstStyle/>
           <a:p>
             <a:r>
-              <a:rPr lang="nl-NL" smtClean="0"/>
+              <a:rPr lang="nl-NL"/>
               <a:t>Klik om de stijl te bewerken</a:t>
             </a:r>
-            <a:endParaRPr lang="nl-NL"/>
           </a:p>
         </p:txBody>
       </p:sp>
@@ -2655,38 +2655,37 @@
           <a:p>
             <a:pPr lvl="0"/>
             <a:r>
-              <a:rPr lang="nl-NL" smtClean="0"/>
+              <a:rPr lang="nl-NL"/>
               <a:t>Klik om de modelstijlen te bewerken</a:t>
             </a:r>
           </a:p>
           <a:p>
             <a:pPr lvl="1"/>
             <a:r>
-              <a:rPr lang="nl-NL" smtClean="0"/>
+              <a:rPr lang="nl-NL"/>
               <a:t>Tweede niveau</a:t>
             </a:r>
           </a:p>
           <a:p>
             <a:pPr lvl="2"/>
             <a:r>
-              <a:rPr lang="nl-NL" smtClean="0"/>
+              <a:rPr lang="nl-NL"/>
               <a:t>Derde niveau</a:t>
             </a:r>
           </a:p>
           <a:p>
             <a:pPr lvl="3"/>
             <a:r>
-              <a:rPr lang="nl-NL" smtClean="0"/>
+              <a:rPr lang="nl-NL"/>
               <a:t>Vierde niveau</a:t>
             </a:r>
           </a:p>
           <a:p>
             <a:pPr lvl="4"/>
             <a:r>
-              <a:rPr lang="nl-NL" smtClean="0"/>
+              <a:rPr lang="nl-NL"/>
               <a:t>Vijfde niveau</a:t>
             </a:r>
-            <a:endParaRPr lang="nl-NL"/>
           </a:p>
         </p:txBody>
       </p:sp>
@@ -3121,7 +3120,7 @@
           <a:lstStyle/>
           <a:p>
             <a:r>
-              <a:rPr lang="nl-NL" dirty="0" err="1" smtClean="0"/>
+              <a:rPr lang="nl-NL" dirty="0" err="1"/>
               <a:t>Tetris</a:t>
             </a:r>
             <a:endParaRPr lang="nl-NL" dirty="0"/>
@@ -3144,17 +3143,17 @@
           <a:lstStyle/>
           <a:p>
             <a:r>
-              <a:rPr lang="nl-NL" dirty="0" smtClean="0"/>
+              <a:rPr lang="nl-NL" dirty="0"/>
               <a:t>Wouter Remijn</a:t>
             </a:r>
           </a:p>
           <a:p>
             <a:r>
-              <a:rPr lang="nl-NL" dirty="0" smtClean="0"/>
+              <a:rPr lang="nl-NL" dirty="0"/>
               <a:t>Mitchell </a:t>
             </a:r>
             <a:r>
-              <a:rPr lang="nl-NL" dirty="0" err="1" smtClean="0"/>
+              <a:rPr lang="nl-NL" dirty="0" err="1"/>
               <a:t>Coutinho</a:t>
             </a:r>
             <a:endParaRPr lang="nl-NL" dirty="0"/>
@@ -3212,10 +3211,9 @@
           <a:lstStyle/>
           <a:p>
             <a:r>
-              <a:rPr lang="nl-NL" dirty="0" smtClean="0"/>
+              <a:rPr lang="nl-NL" dirty="0"/>
               <a:t>Demo</a:t>
             </a:r>
-            <a:endParaRPr lang="nl-NL" dirty="0"/>
           </a:p>
         </p:txBody>
       </p:sp>
@@ -3265,56 +3263,55 @@
           <a:lstStyle/>
           <a:p>
             <a:r>
-              <a:rPr lang="nl-NL" dirty="0" smtClean="0"/>
+              <a:rPr lang="nl-NL" dirty="0"/>
               <a:t>Technologie</a:t>
             </a:r>
+          </a:p>
+        </p:txBody>
+      </p:sp>
+      <p:sp>
+        <p:nvSpPr>
+          <p:cNvPr id="3" name="Tijdelijke aanduiding voor inhoud 2"/>
+          <p:cNvSpPr>
+            <a:spLocks noGrp="1"/>
+          </p:cNvSpPr>
+          <p:nvPr>
+            <p:ph idx="1"/>
+          </p:nvPr>
+        </p:nvSpPr>
+        <p:spPr/>
+        <p:txBody>
+          <a:bodyPr/>
+          <a:lstStyle/>
+          <a:p>
+            <a:r>
+              <a:rPr lang="nl-NL" dirty="0"/>
+              <a:t>Spring</a:t>
+            </a:r>
+          </a:p>
+          <a:p>
+            <a:r>
+              <a:rPr lang="nl-NL" dirty="0"/>
+              <a:t>Database</a:t>
+            </a:r>
+          </a:p>
+          <a:p>
+            <a:r>
+              <a:rPr lang="nl-NL" dirty="0" err="1"/>
+              <a:t>Websockets</a:t>
+            </a:r>
             <a:endParaRPr lang="nl-NL" dirty="0"/>
           </a:p>
-        </p:txBody>
-      </p:sp>
-      <p:sp>
-        <p:nvSpPr>
-          <p:cNvPr id="3" name="Tijdelijke aanduiding voor inhoud 2"/>
-          <p:cNvSpPr>
-            <a:spLocks noGrp="1"/>
-          </p:cNvSpPr>
-          <p:nvPr>
-            <p:ph idx="1"/>
-          </p:nvPr>
-        </p:nvSpPr>
-        <p:spPr/>
-        <p:txBody>
-          <a:bodyPr/>
-          <a:lstStyle/>
-          <a:p>
-            <a:r>
-              <a:rPr lang="nl-NL" dirty="0" smtClean="0"/>
-              <a:t>Spring</a:t>
-            </a:r>
-          </a:p>
-          <a:p>
-            <a:r>
-              <a:rPr lang="nl-NL" dirty="0" smtClean="0"/>
-              <a:t>Database</a:t>
-            </a:r>
-          </a:p>
-          <a:p>
-            <a:r>
-              <a:rPr lang="nl-NL" dirty="0" err="1" smtClean="0"/>
-              <a:t>Websockets</a:t>
-            </a:r>
-            <a:endParaRPr lang="nl-NL" dirty="0" smtClean="0"/>
-          </a:p>
-          <a:p>
-            <a:r>
-              <a:rPr lang="nl-NL" dirty="0" smtClean="0"/>
+          <a:p>
+            <a:r>
+              <a:rPr lang="nl-NL" dirty="0"/>
               <a:t>Javascript</a:t>
             </a:r>
           </a:p>
           <a:p>
             <a:pPr lvl="1"/>
             <a:r>
-              <a:rPr lang="nl-NL" dirty="0" err="1" smtClean="0"/>
+              <a:rPr lang="nl-NL" dirty="0" err="1"/>
               <a:t>JQuery</a:t>
             </a:r>
             <a:endParaRPr lang="nl-NL" dirty="0"/>
@@ -3367,10 +3364,9 @@
           <a:lstStyle/>
           <a:p>
             <a:r>
-              <a:rPr lang="nl-NL" dirty="0" smtClean="0"/>
+              <a:rPr lang="nl-NL" dirty="0"/>
               <a:t>UML</a:t>
             </a:r>
-            <a:endParaRPr lang="nl-NL" dirty="0"/>
           </a:p>
         </p:txBody>
       </p:sp>
@@ -3449,64 +3445,95 @@
           <a:lstStyle/>
           <a:p>
             <a:r>
-              <a:rPr lang="nl-NL" dirty="0" smtClean="0"/>
+              <a:rPr lang="nl-NL" dirty="0"/>
               <a:t>Problemen</a:t>
             </a:r>
+          </a:p>
+        </p:txBody>
+      </p:sp>
+      <p:sp>
+        <p:nvSpPr>
+          <p:cNvPr id="3" name="Tijdelijke aanduiding voor inhoud 2"/>
+          <p:cNvSpPr>
+            <a:spLocks noGrp="1"/>
+          </p:cNvSpPr>
+          <p:nvPr>
+            <p:ph idx="1"/>
+          </p:nvPr>
+        </p:nvSpPr>
+        <p:spPr/>
+        <p:txBody>
+          <a:bodyPr/>
+          <a:lstStyle/>
+          <a:p>
+            <a:r>
+              <a:rPr lang="nl-NL" dirty="0" err="1"/>
+              <a:t>Websockets</a:t>
+            </a:r>
             <a:endParaRPr lang="nl-NL" dirty="0"/>
           </a:p>
-        </p:txBody>
-      </p:sp>
-      <p:sp>
-        <p:nvSpPr>
-          <p:cNvPr id="3" name="Tijdelijke aanduiding voor inhoud 2"/>
-          <p:cNvSpPr>
-            <a:spLocks noGrp="1"/>
-          </p:cNvSpPr>
-          <p:nvPr>
-            <p:ph idx="1"/>
-          </p:nvPr>
-        </p:nvSpPr>
-        <p:spPr/>
-        <p:txBody>
-          <a:bodyPr/>
-          <a:lstStyle/>
-          <a:p>
-            <a:r>
-              <a:rPr lang="nl-NL" dirty="0" err="1" smtClean="0"/>
-              <a:t>Websockets</a:t>
-            </a:r>
-            <a:endParaRPr lang="nl-NL" dirty="0" smtClean="0"/>
-          </a:p>
-          <a:p>
-            <a:r>
-              <a:rPr lang="nl-NL" dirty="0" smtClean="0"/>
+          <a:p>
+            <a:r>
+              <a:rPr lang="nl-NL" dirty="0"/>
               <a:t>Sessies</a:t>
             </a:r>
           </a:p>
           <a:p>
             <a:r>
-              <a:rPr lang="nl-NL" dirty="0" smtClean="0"/>
+              <a:rPr lang="nl-NL" dirty="0"/>
               <a:t>Grafische </a:t>
             </a:r>
             <a:r>
-              <a:rPr lang="nl-NL" dirty="0" err="1" smtClean="0"/>
+              <a:rPr lang="nl-NL" dirty="0" err="1"/>
               <a:t>glitches</a:t>
             </a:r>
-            <a:endParaRPr lang="nl-NL" dirty="0" smtClean="0"/>
-          </a:p>
-          <a:p>
-            <a:r>
-              <a:rPr lang="nl-NL" dirty="0" err="1" smtClean="0"/>
+            <a:endParaRPr lang="nl-NL" dirty="0"/>
+          </a:p>
+          <a:p>
+            <a:r>
+              <a:rPr lang="nl-NL" dirty="0" err="1"/>
               <a:t>Refactor</a:t>
             </a:r>
-            <a:r>
-              <a:rPr lang="nl-NL" dirty="0" smtClean="0"/>
-              <a:t> introduceerde lastige bugs</a:t>
-            </a:r>
             <a:endParaRPr lang="nl-NL" dirty="0"/>
           </a:p>
         </p:txBody>
       </p:sp>
+      <p:pic>
+        <p:nvPicPr>
+          <p:cNvPr id="5" name="Afbeelding 4">
+            <a:extLst>
+              <a:ext uri="{FF2B5EF4-FFF2-40B4-BE49-F238E27FC236}">
+                <a16:creationId xmlns:a16="http://schemas.microsoft.com/office/drawing/2014/main" id="{FDE35F91-FB4B-4FDA-86CA-4222E11F72E6}"/>
+              </a:ext>
+            </a:extLst>
+          </p:cNvPr>
+          <p:cNvPicPr>
+            <a:picLocks noChangeAspect="1"/>
+          </p:cNvPicPr>
+          <p:nvPr/>
+        </p:nvPicPr>
+        <p:blipFill>
+          <a:blip r:embed="rId2">
+            <a:extLst>
+              <a:ext uri="{28A0092B-C50C-407E-A947-70E740481C1C}">
+                <a14:useLocalDpi xmlns:a14="http://schemas.microsoft.com/office/drawing/2010/main" val="0"/>
+              </a:ext>
+            </a:extLst>
+          </a:blip>
+          <a:stretch>
+            <a:fillRect/>
+          </a:stretch>
+        </p:blipFill>
+        <p:spPr>
+          <a:xfrm>
+            <a:off x="6151505" y="1452985"/>
+            <a:ext cx="2550814" cy="5067389"/>
+          </a:xfrm>
+          <a:prstGeom prst="rect">
+            <a:avLst/>
+          </a:prstGeom>
+        </p:spPr>
+      </p:pic>
     </p:spTree>
     <p:extLst>
       <p:ext uri="{BB962C8B-B14F-4D97-AF65-F5344CB8AC3E}">
@@ -3553,67 +3580,66 @@
           <a:lstStyle/>
           <a:p>
             <a:r>
-              <a:rPr lang="nl-NL" dirty="0" smtClean="0"/>
+              <a:rPr lang="nl-NL" dirty="0"/>
               <a:t>Wat hebben we geleerd</a:t>
             </a:r>
+          </a:p>
+        </p:txBody>
+      </p:sp>
+      <p:sp>
+        <p:nvSpPr>
+          <p:cNvPr id="3" name="Tijdelijke aanduiding voor inhoud 2"/>
+          <p:cNvSpPr>
+            <a:spLocks noGrp="1"/>
+          </p:cNvSpPr>
+          <p:nvPr>
+            <p:ph idx="1"/>
+          </p:nvPr>
+        </p:nvSpPr>
+        <p:spPr/>
+        <p:txBody>
+          <a:bodyPr/>
+          <a:lstStyle/>
+          <a:p>
+            <a:r>
+              <a:rPr lang="nl-NL" dirty="0"/>
+              <a:t>Werken en leren met nieuwe technologieën</a:t>
+            </a:r>
+          </a:p>
+          <a:p>
+            <a:pPr lvl="1"/>
+            <a:r>
+              <a:rPr lang="nl-NL" dirty="0"/>
+              <a:t>Spring</a:t>
+            </a:r>
+          </a:p>
+          <a:p>
+            <a:pPr lvl="1"/>
+            <a:r>
+              <a:rPr lang="nl-NL" dirty="0" err="1"/>
+              <a:t>Hibernate</a:t>
+            </a:r>
             <a:endParaRPr lang="nl-NL" dirty="0"/>
           </a:p>
-        </p:txBody>
-      </p:sp>
-      <p:sp>
-        <p:nvSpPr>
-          <p:cNvPr id="3" name="Tijdelijke aanduiding voor inhoud 2"/>
-          <p:cNvSpPr>
-            <a:spLocks noGrp="1"/>
-          </p:cNvSpPr>
-          <p:nvPr>
-            <p:ph idx="1"/>
-          </p:nvPr>
-        </p:nvSpPr>
-        <p:spPr/>
-        <p:txBody>
-          <a:bodyPr/>
-          <a:lstStyle/>
-          <a:p>
-            <a:r>
-              <a:rPr lang="nl-NL" dirty="0" smtClean="0"/>
-              <a:t>Werken en leren met nieuwe technologieën</a:t>
-            </a:r>
-          </a:p>
           <a:p>
             <a:pPr lvl="1"/>
             <a:r>
-              <a:rPr lang="nl-NL" dirty="0" smtClean="0"/>
-              <a:t>Spring</a:t>
-            </a:r>
-          </a:p>
-          <a:p>
-            <a:pPr lvl="1"/>
-            <a:r>
-              <a:rPr lang="nl-NL" dirty="0" err="1" smtClean="0"/>
-              <a:t>Hibernate</a:t>
-            </a:r>
-            <a:endParaRPr lang="nl-NL" dirty="0" smtClean="0"/>
-          </a:p>
-          <a:p>
-            <a:pPr lvl="1"/>
-            <a:r>
-              <a:rPr lang="nl-NL" dirty="0" err="1" smtClean="0"/>
+              <a:rPr lang="nl-NL" dirty="0" err="1"/>
               <a:t>Websockets</a:t>
             </a:r>
-            <a:endParaRPr lang="nl-NL" dirty="0" smtClean="0"/>
-          </a:p>
-          <a:p>
-            <a:r>
-              <a:rPr lang="nl-NL" dirty="0" smtClean="0"/>
+            <a:endParaRPr lang="nl-NL" dirty="0"/>
+          </a:p>
+          <a:p>
+            <a:r>
+              <a:rPr lang="nl-NL" dirty="0"/>
               <a:t>Wanneer nieuwe </a:t>
             </a:r>
             <a:r>
-              <a:rPr lang="nl-NL" dirty="0" err="1" smtClean="0"/>
+              <a:rPr lang="nl-NL" dirty="0" err="1"/>
               <a:t>tech</a:t>
             </a:r>
             <a:r>
-              <a:rPr lang="nl-NL" dirty="0" smtClean="0"/>
+              <a:rPr lang="nl-NL" dirty="0"/>
               <a:t> wel of niet toe te passen in een lopend project</a:t>
             </a:r>
           </a:p>

</xml_diff>

<commit_message>
Switched UML and Technologies slides
</commit_message>
<xml_diff>
--- a/Tetris.pptx
+++ b/Tetris.pptx
@@ -8,8 +8,8 @@
     <p:sldId id="256" r:id="rId2"/>
     <p:sldId id="263" r:id="rId3"/>
     <p:sldId id="257" r:id="rId4"/>
-    <p:sldId id="261" r:id="rId5"/>
-    <p:sldId id="258" r:id="rId6"/>
+    <p:sldId id="258" r:id="rId5"/>
+    <p:sldId id="261" r:id="rId6"/>
     <p:sldId id="259" r:id="rId7"/>
     <p:sldId id="262" r:id="rId8"/>
   </p:sldIdLst>
@@ -112,7 +112,7 @@
   </p:defaultTextStyle>
   <p:extLst>
     <p:ext uri="{EFAFB233-063F-42B5-8137-9DF3F51BA10A}">
-      <p15:sldGuideLst xmlns:p15="http://schemas.microsoft.com/office/powerpoint/2012/main" xmlns="">
+      <p15:sldGuideLst xmlns:p15="http://schemas.microsoft.com/office/powerpoint/2012/main">
         <p15:guide id="1" orient="horz" pos="2160">
           <p15:clr>
             <a:srgbClr val="A4A3A4"/>
@@ -3207,73 +3207,72 @@
           <a:lstStyle/>
           <a:p>
             <a:r>
-              <a:rPr lang="nl-NL" dirty="0" smtClean="0"/>
+              <a:rPr lang="nl-NL" dirty="0"/>
               <a:t>Planning</a:t>
             </a:r>
+          </a:p>
+        </p:txBody>
+      </p:sp>
+      <p:sp>
+        <p:nvSpPr>
+          <p:cNvPr id="3" name="Tijdelijke aanduiding voor inhoud 2"/>
+          <p:cNvSpPr>
+            <a:spLocks noGrp="1"/>
+          </p:cNvSpPr>
+          <p:nvPr>
+            <p:ph idx="1"/>
+          </p:nvPr>
+        </p:nvSpPr>
+        <p:spPr/>
+        <p:txBody>
+          <a:bodyPr/>
+          <a:lstStyle/>
+          <a:p>
+            <a:r>
+              <a:rPr lang="nl-NL" dirty="0" err="1"/>
+              <a:t>Tetris</a:t>
+            </a:r>
+            <a:r>
+              <a:rPr lang="nl-NL" dirty="0"/>
+              <a:t> via server</a:t>
+            </a:r>
+          </a:p>
+          <a:p>
+            <a:r>
+              <a:rPr lang="nl-NL" dirty="0"/>
+              <a:t>Java, </a:t>
+            </a:r>
+            <a:r>
+              <a:rPr lang="nl-NL" dirty="0" err="1"/>
+              <a:t>Jsp</a:t>
+            </a:r>
+            <a:r>
+              <a:rPr lang="nl-NL" dirty="0"/>
+              <a:t>, </a:t>
+            </a:r>
+            <a:r>
+              <a:rPr lang="nl-NL" dirty="0" err="1"/>
+              <a:t>jQuery</a:t>
+            </a:r>
+            <a:r>
+              <a:rPr lang="nl-NL" dirty="0"/>
+              <a:t>, </a:t>
+            </a:r>
+            <a:r>
+              <a:rPr lang="nl-NL" dirty="0" err="1"/>
+              <a:t>css</a:t>
+            </a:r>
             <a:endParaRPr lang="nl-NL" dirty="0"/>
           </a:p>
-        </p:txBody>
-      </p:sp>
-      <p:sp>
-        <p:nvSpPr>
-          <p:cNvPr id="3" name="Tijdelijke aanduiding voor inhoud 2"/>
-          <p:cNvSpPr>
-            <a:spLocks noGrp="1"/>
-          </p:cNvSpPr>
-          <p:nvPr>
-            <p:ph idx="1"/>
-          </p:nvPr>
-        </p:nvSpPr>
-        <p:spPr/>
-        <p:txBody>
-          <a:bodyPr/>
-          <a:lstStyle/>
-          <a:p>
-            <a:r>
-              <a:rPr lang="nl-NL" dirty="0" err="1" smtClean="0"/>
-              <a:t>Tetris</a:t>
-            </a:r>
-            <a:r>
-              <a:rPr lang="nl-NL" dirty="0" smtClean="0"/>
-              <a:t> via server</a:t>
-            </a:r>
-          </a:p>
-          <a:p>
-            <a:r>
-              <a:rPr lang="nl-NL" dirty="0" smtClean="0"/>
-              <a:t>Java, </a:t>
-            </a:r>
-            <a:r>
-              <a:rPr lang="nl-NL" dirty="0" err="1" smtClean="0"/>
-              <a:t>Jsp</a:t>
-            </a:r>
-            <a:r>
-              <a:rPr lang="nl-NL" dirty="0" smtClean="0"/>
-              <a:t>, </a:t>
-            </a:r>
-            <a:r>
-              <a:rPr lang="nl-NL" dirty="0" err="1" smtClean="0"/>
-              <a:t>jQuery</a:t>
-            </a:r>
-            <a:r>
-              <a:rPr lang="nl-NL" dirty="0" smtClean="0"/>
-              <a:t>, </a:t>
-            </a:r>
-            <a:r>
-              <a:rPr lang="nl-NL" dirty="0" err="1" smtClean="0"/>
-              <a:t>css</a:t>
-            </a:r>
-            <a:endParaRPr lang="nl-NL" dirty="0" smtClean="0"/>
-          </a:p>
-          <a:p>
-            <a:r>
-              <a:rPr lang="nl-NL" dirty="0" smtClean="0"/>
+          <a:p>
+            <a:r>
+              <a:rPr lang="nl-NL" dirty="0"/>
               <a:t>Prototype in javascript</a:t>
             </a:r>
           </a:p>
           <a:p>
             <a:r>
-              <a:rPr lang="nl-NL" smtClean="0"/>
+              <a:rPr lang="nl-NL"/>
               <a:t>Websockets</a:t>
             </a:r>
             <a:endParaRPr lang="nl-NL" dirty="0"/>
@@ -3351,119 +3350,6 @@
 </file>
 
 <file path=ppt/slides/slide4.xml><?xml version="1.0" encoding="utf-8"?>
-<p:sld xmlns:a="http://schemas.openxmlformats.org/drawingml/2006/main" xmlns:r="http://schemas.openxmlformats.org/officeDocument/2006/relationships" xmlns:p="http://schemas.openxmlformats.org/presentationml/2006/main">
-  <p:cSld>
-    <p:spTree>
-      <p:nvGrpSpPr>
-        <p:cNvPr id="1" name=""/>
-        <p:cNvGrpSpPr/>
-        <p:nvPr/>
-      </p:nvGrpSpPr>
-      <p:grpSpPr>
-        <a:xfrm>
-          <a:off x="0" y="0"/>
-          <a:ext cx="0" cy="0"/>
-          <a:chOff x="0" y="0"/>
-          <a:chExt cx="0" cy="0"/>
-        </a:xfrm>
-      </p:grpSpPr>
-      <p:sp>
-        <p:nvSpPr>
-          <p:cNvPr id="2" name="Titel 1"/>
-          <p:cNvSpPr>
-            <a:spLocks noGrp="1"/>
-          </p:cNvSpPr>
-          <p:nvPr>
-            <p:ph type="title"/>
-          </p:nvPr>
-        </p:nvSpPr>
-        <p:spPr/>
-        <p:txBody>
-          <a:bodyPr/>
-          <a:lstStyle/>
-          <a:p>
-            <a:r>
-              <a:rPr lang="nl-NL" dirty="0"/>
-              <a:t>Technologie</a:t>
-            </a:r>
-          </a:p>
-        </p:txBody>
-      </p:sp>
-      <p:sp>
-        <p:nvSpPr>
-          <p:cNvPr id="3" name="Tijdelijke aanduiding voor inhoud 2"/>
-          <p:cNvSpPr>
-            <a:spLocks noGrp="1"/>
-          </p:cNvSpPr>
-          <p:nvPr>
-            <p:ph idx="1"/>
-          </p:nvPr>
-        </p:nvSpPr>
-        <p:spPr/>
-        <p:txBody>
-          <a:bodyPr/>
-          <a:lstStyle/>
-          <a:p>
-            <a:r>
-              <a:rPr lang="nl-NL" dirty="0"/>
-              <a:t>Spring</a:t>
-            </a:r>
-          </a:p>
-          <a:p>
-            <a:r>
-              <a:rPr lang="nl-NL" dirty="0" smtClean="0"/>
-              <a:t>Database via </a:t>
-            </a:r>
-            <a:r>
-              <a:rPr lang="nl-NL" dirty="0" err="1" smtClean="0"/>
-              <a:t>Hibernate</a:t>
-            </a:r>
-            <a:endParaRPr lang="nl-NL" dirty="0"/>
-          </a:p>
-          <a:p>
-            <a:r>
-              <a:rPr lang="nl-NL" dirty="0" err="1"/>
-              <a:t>Websockets</a:t>
-            </a:r>
-            <a:endParaRPr lang="nl-NL" dirty="0"/>
-          </a:p>
-          <a:p>
-            <a:r>
-              <a:rPr lang="nl-NL" dirty="0"/>
-              <a:t>Javascript</a:t>
-            </a:r>
-          </a:p>
-          <a:p>
-            <a:pPr lvl="1"/>
-            <a:r>
-              <a:rPr lang="nl-NL" dirty="0" err="1" smtClean="0"/>
-              <a:t>Jquery</a:t>
-            </a:r>
-            <a:endParaRPr lang="nl-NL" dirty="0" smtClean="0"/>
-          </a:p>
-          <a:p>
-            <a:r>
-              <a:rPr lang="nl-NL" dirty="0" smtClean="0"/>
-              <a:t>Bootstrap</a:t>
-            </a:r>
-            <a:endParaRPr lang="nl-NL" dirty="0"/>
-          </a:p>
-        </p:txBody>
-      </p:sp>
-    </p:spTree>
-    <p:extLst>
-      <p:ext uri="{BB962C8B-B14F-4D97-AF65-F5344CB8AC3E}">
-        <p14:creationId xmlns:p14="http://schemas.microsoft.com/office/powerpoint/2010/main" val="327246348"/>
-      </p:ext>
-    </p:extLst>
-  </p:cSld>
-  <p:clrMapOvr>
-    <a:masterClrMapping/>
-  </p:clrMapOvr>
-</p:sld>
-</file>
-
-<file path=ppt/slides/slide5.xml><?xml version="1.0" encoding="utf-8"?>
 <p:sld xmlns:a="http://schemas.openxmlformats.org/drawingml/2006/main" xmlns:r="http://schemas.openxmlformats.org/officeDocument/2006/relationships" xmlns:p="http://schemas.openxmlformats.org/presentationml/2006/main">
   <p:cSld>
     <p:spTree>
@@ -3544,6 +3430,118 @@
 </p:sld>
 </file>
 
+<file path=ppt/slides/slide5.xml><?xml version="1.0" encoding="utf-8"?>
+<p:sld xmlns:a="http://schemas.openxmlformats.org/drawingml/2006/main" xmlns:r="http://schemas.openxmlformats.org/officeDocument/2006/relationships" xmlns:p="http://schemas.openxmlformats.org/presentationml/2006/main">
+  <p:cSld>
+    <p:spTree>
+      <p:nvGrpSpPr>
+        <p:cNvPr id="1" name=""/>
+        <p:cNvGrpSpPr/>
+        <p:nvPr/>
+      </p:nvGrpSpPr>
+      <p:grpSpPr>
+        <a:xfrm>
+          <a:off x="0" y="0"/>
+          <a:ext cx="0" cy="0"/>
+          <a:chOff x="0" y="0"/>
+          <a:chExt cx="0" cy="0"/>
+        </a:xfrm>
+      </p:grpSpPr>
+      <p:sp>
+        <p:nvSpPr>
+          <p:cNvPr id="2" name="Titel 1"/>
+          <p:cNvSpPr>
+            <a:spLocks noGrp="1"/>
+          </p:cNvSpPr>
+          <p:nvPr>
+            <p:ph type="title"/>
+          </p:nvPr>
+        </p:nvSpPr>
+        <p:spPr/>
+        <p:txBody>
+          <a:bodyPr/>
+          <a:lstStyle/>
+          <a:p>
+            <a:r>
+              <a:rPr lang="nl-NL" dirty="0"/>
+              <a:t>Technologie</a:t>
+            </a:r>
+          </a:p>
+        </p:txBody>
+      </p:sp>
+      <p:sp>
+        <p:nvSpPr>
+          <p:cNvPr id="3" name="Tijdelijke aanduiding voor inhoud 2"/>
+          <p:cNvSpPr>
+            <a:spLocks noGrp="1"/>
+          </p:cNvSpPr>
+          <p:nvPr>
+            <p:ph idx="1"/>
+          </p:nvPr>
+        </p:nvSpPr>
+        <p:spPr/>
+        <p:txBody>
+          <a:bodyPr/>
+          <a:lstStyle/>
+          <a:p>
+            <a:r>
+              <a:rPr lang="nl-NL" dirty="0"/>
+              <a:t>Spring</a:t>
+            </a:r>
+          </a:p>
+          <a:p>
+            <a:r>
+              <a:rPr lang="nl-NL" dirty="0"/>
+              <a:t>Database via </a:t>
+            </a:r>
+            <a:r>
+              <a:rPr lang="nl-NL" dirty="0" err="1"/>
+              <a:t>Hibernate</a:t>
+            </a:r>
+            <a:endParaRPr lang="nl-NL" dirty="0"/>
+          </a:p>
+          <a:p>
+            <a:r>
+              <a:rPr lang="nl-NL" dirty="0" err="1"/>
+              <a:t>Websockets</a:t>
+            </a:r>
+            <a:endParaRPr lang="nl-NL" dirty="0"/>
+          </a:p>
+          <a:p>
+            <a:r>
+              <a:rPr lang="nl-NL" dirty="0"/>
+              <a:t>Javascript</a:t>
+            </a:r>
+          </a:p>
+          <a:p>
+            <a:pPr lvl="1"/>
+            <a:r>
+              <a:rPr lang="nl-NL" dirty="0" err="1"/>
+              <a:t>Jquery</a:t>
+            </a:r>
+            <a:endParaRPr lang="nl-NL" dirty="0"/>
+          </a:p>
+          <a:p>
+            <a:r>
+              <a:rPr lang="nl-NL" dirty="0"/>
+              <a:t>Bootstrap</a:t>
+            </a:r>
+          </a:p>
+        </p:txBody>
+      </p:sp>
+    </p:spTree>
+    <p:extLst>
+      <p:ext uri="{BB962C8B-B14F-4D97-AF65-F5344CB8AC3E}">
+        <p14:creationId xmlns:p14="http://schemas.microsoft.com/office/powerpoint/2010/main" val="327246348"/>
+      </p:ext>
+    </p:extLst>
+  </p:cSld>
+  <p:clrMapOvr>
+    <a:masterClrMapping/>
+  </p:clrMapOvr>
+</p:sld>
+</file>
+
 <file path=ppt/slides/slide6.xml><?xml version="1.0" encoding="utf-8"?>
 <p:sld xmlns:a="http://schemas.openxmlformats.org/drawingml/2006/main" xmlns:r="http://schemas.openxmlformats.org/officeDocument/2006/relationships" xmlns:p="http://schemas.openxmlformats.org/presentationml/2006/main">
   <p:cSld>
@@ -3623,10 +3621,10 @@
           </a:p>
           <a:p>
             <a:r>
-              <a:rPr lang="nl-NL" dirty="0" err="1" smtClean="0"/>
+              <a:rPr lang="nl-NL" dirty="0" err="1"/>
               <a:t>Refactor</a:t>
             </a:r>
-            <a:endParaRPr lang="nl-NL" dirty="0" smtClean="0"/>
+            <a:endParaRPr lang="nl-NL" dirty="0"/>
           </a:p>
         </p:txBody>
       </p:sp>
@@ -3635,7 +3633,7 @@
           <p:cNvPr id="5" name="Afbeelding 4">
             <a:extLst>
               <a:ext uri="{FF2B5EF4-FFF2-40B4-BE49-F238E27FC236}">
-                <a16:creationId xmlns:a16="http://schemas.microsoft.com/office/drawing/2014/main" xmlns="" id="{FDE35F91-FB4B-4FDA-86CA-4222E11F72E6}"/>
+                <a16:creationId xmlns:a16="http://schemas.microsoft.com/office/drawing/2014/main" id="{FDE35F91-FB4B-4FDA-86CA-4222E11F72E6}"/>
               </a:ext>
             </a:extLst>
           </p:cNvPr>

</xml_diff>

<commit_message>
added multiplayer to planning
</commit_message>
<xml_diff>
--- a/Tetris.pptx
+++ b/Tetris.pptx
@@ -112,7 +112,7 @@
   </p:defaultTextStyle>
   <p:extLst>
     <p:ext uri="{EFAFB233-063F-42B5-8137-9DF3F51BA10A}">
-      <p15:sldGuideLst xmlns:p15="http://schemas.microsoft.com/office/powerpoint/2012/main">
+      <p15:sldGuideLst xmlns:p15="http://schemas.microsoft.com/office/powerpoint/2012/main" xmlns="">
         <p15:guide id="1" orient="horz" pos="2160">
           <p15:clr>
             <a:srgbClr val="A4A3A4"/>
@@ -3272,8 +3272,15 @@
           </a:p>
           <a:p>
             <a:r>
-              <a:rPr lang="nl-NL"/>
+              <a:rPr lang="nl-NL" dirty="0" err="1" smtClean="0"/>
               <a:t>Websockets</a:t>
+            </a:r>
+            <a:endParaRPr lang="nl-NL" dirty="0" smtClean="0"/>
+          </a:p>
+          <a:p>
+            <a:r>
+              <a:rPr lang="nl-NL" dirty="0" err="1" smtClean="0"/>
+              <a:t>Multiplayer</a:t>
             </a:r>
             <a:endParaRPr lang="nl-NL" dirty="0"/>
           </a:p>
@@ -3633,7 +3640,7 @@
           <p:cNvPr id="5" name="Afbeelding 4">
             <a:extLst>
               <a:ext uri="{FF2B5EF4-FFF2-40B4-BE49-F238E27FC236}">
-                <a16:creationId xmlns:a16="http://schemas.microsoft.com/office/drawing/2014/main" id="{FDE35F91-FB4B-4FDA-86CA-4222E11F72E6}"/>
+                <a16:creationId xmlns:a16="http://schemas.microsoft.com/office/drawing/2014/main" xmlns="" id="{FDE35F91-FB4B-4FDA-86CA-4222E11F72E6}"/>
               </a:ext>
             </a:extLst>
           </p:cNvPr>

</xml_diff>